<commit_message>
Created Data Science Resources
</commit_message>
<xml_diff>
--- a/Data Science resources/Introduction to Data Science/Slides/Slide Unit 1/1. Data.pptx
+++ b/Data Science resources/Introduction to Data Science/Slides/Slide Unit 1/1. Data.pptx
@@ -258,7 +258,7 @@
           <a:p>
             <a:fld id="{E4DABB7E-5FD5-4FD4-8200-24B5A1924914}" type="datetimeFigureOut">
               <a:rPr lang="en-US" smtClean="0"/>
-              <a:t>03-May-24</a:t>
+              <a:t>5/3/2024</a:t>
             </a:fld>
             <a:endParaRPr lang="en-US"/>
           </a:p>
@@ -435,7 +435,7 @@
           <a:p>
             <a:fld id="{9BDC6C4C-B340-4EE6-8690-61E4F94D1E11}" type="datetimeFigureOut">
               <a:rPr lang="en-US" smtClean="0"/>
-              <a:t>03-May-24</a:t>
+              <a:t>5/3/2024</a:t>
             </a:fld>
             <a:endParaRPr lang="en-US"/>
           </a:p>
@@ -2109,7 +2109,7 @@
           </p:cNvGraphicFramePr>
           <p:nvPr userDrawn="1">
             <p:custDataLst>
-              <p:tags r:id="rId2"/>
+              <p:tags r:id="rId1"/>
             </p:custDataLst>
           </p:nvPr>
         </p:nvGraphicFramePr>
@@ -2121,12 +2121,12 @@
           <a:graphicData uri="http://schemas.openxmlformats.org/presentationml/2006/ole">
             <mc:AlternateContent xmlns:mc="http://schemas.openxmlformats.org/markup-compatibility/2006">
               <mc:Choice xmlns:v="urn:schemas-microsoft-com:vml" Requires="v">
-                <p:oleObj spid="_x0000_s4098" name="think-cell Slide" r:id="rId4" imgW="425" imgH="426" progId="TCLayout.ActiveDocument.1">
+                <p:oleObj name="think-cell Slide" r:id="rId3" imgW="425" imgH="426" progId="TCLayout.ActiveDocument.1">
                   <p:embed/>
                 </p:oleObj>
               </mc:Choice>
               <mc:Fallback>
-                <p:oleObj name="think-cell Slide" r:id="rId4" imgW="425" imgH="426" progId="TCLayout.ActiveDocument.1">
+                <p:oleObj name="think-cell Slide" r:id="rId3" imgW="425" imgH="426" progId="TCLayout.ActiveDocument.1">
                   <p:embed/>
                   <p:pic>
                     <p:nvPicPr>
@@ -2135,7 +2135,7 @@
                       <p:nvPr/>
                     </p:nvPicPr>
                     <p:blipFill>
-                      <a:blip r:embed="rId5"/>
+                      <a:blip r:embed="rId4"/>
                       <a:stretch>
                         <a:fillRect/>
                       </a:stretch>
@@ -2342,7 +2342,7 @@
           <p:nvPr userDrawn="1"/>
         </p:nvPicPr>
         <p:blipFill>
-          <a:blip r:embed="rId6"/>
+          <a:blip r:embed="rId5"/>
           <a:stretch>
             <a:fillRect/>
           </a:stretch>
@@ -3212,7 +3212,7 @@
           </p:cNvGraphicFramePr>
           <p:nvPr userDrawn="1">
             <p:custDataLst>
-              <p:tags r:id="rId6"/>
+              <p:tags r:id="rId5"/>
             </p:custDataLst>
           </p:nvPr>
         </p:nvGraphicFramePr>
@@ -3224,12 +3224,12 @@
           <a:graphicData uri="http://schemas.openxmlformats.org/presentationml/2006/ole">
             <mc:AlternateContent xmlns:mc="http://schemas.openxmlformats.org/markup-compatibility/2006">
               <mc:Choice xmlns:v="urn:schemas-microsoft-com:vml" Requires="v">
-                <p:oleObj spid="_x0000_s3074" name="think-cell Slide" r:id="rId7" imgW="425" imgH="426" progId="TCLayout.ActiveDocument.1">
+                <p:oleObj name="think-cell Slide" r:id="rId6" imgW="425" imgH="426" progId="TCLayout.ActiveDocument.1">
                   <p:embed/>
                 </p:oleObj>
               </mc:Choice>
               <mc:Fallback>
-                <p:oleObj name="think-cell Slide" r:id="rId7" imgW="425" imgH="426" progId="TCLayout.ActiveDocument.1">
+                <p:oleObj name="think-cell Slide" r:id="rId6" imgW="425" imgH="426" progId="TCLayout.ActiveDocument.1">
                   <p:embed/>
                   <p:pic>
                     <p:nvPicPr>
@@ -3238,7 +3238,7 @@
                       <p:nvPr/>
                     </p:nvPicPr>
                     <p:blipFill>
-                      <a:blip r:embed="rId8"/>
+                      <a:blip r:embed="rId7"/>
                       <a:stretch>
                         <a:fillRect/>
                       </a:stretch>
@@ -7872,15 +7872,6 @@
 </file>
 
 <file path=customXml/item1.xml><?xml version="1.0" encoding="utf-8"?>
-<?mso-contentType ?>
-<FormTemplates xmlns="http://schemas.microsoft.com/sharepoint/v3/contenttype/forms">
-  <Display>DocumentLibraryForm</Display>
-  <Edit>DocumentLibraryForm</Edit>
-  <New>DocumentLibraryForm</New>
-</FormTemplates>
-</file>
-
-<file path=customXml/item2.xml><?xml version="1.0" encoding="utf-8"?>
 <ct:contentTypeSchema xmlns:ct="http://schemas.microsoft.com/office/2006/metadata/contentType" xmlns:ma="http://schemas.microsoft.com/office/2006/metadata/properties/metaAttributes" ct:_="" ma:_="" ma:contentTypeName="Document" ma:contentTypeID="0x010100319A35104FAE2A48B18B518F397B7CA4" ma:contentTypeVersion="11" ma:contentTypeDescription="Create a new document." ma:contentTypeScope="" ma:versionID="818dfa9a4b3d3bceb1a965a71e647ec2">
   <xsd:schema xmlns:xsd="http://www.w3.org/2001/XMLSchema" xmlns:xs="http://www.w3.org/2001/XMLSchema" xmlns:p="http://schemas.microsoft.com/office/2006/metadata/properties" xmlns:ns2="0931f5f7-8e4d-4a45-a9a6-891693687166" xmlns:ns3="ea0113d3-9d6b-407b-8175-bd70f3cf5591" targetNamespace="http://schemas.microsoft.com/office/2006/metadata/properties" ma:root="true" ma:fieldsID="449ed37a8757c5d6b7757d0e4c8f3a2b" ns2:_="" ns3:_="">
     <xsd:import namespace="0931f5f7-8e4d-4a45-a9a6-891693687166"/>
@@ -8091,6 +8082,15 @@
 </ct:contentTypeSchema>
 </file>
 
+<file path=customXml/item2.xml><?xml version="1.0" encoding="utf-8"?>
+<?mso-contentType ?>
+<FormTemplates xmlns="http://schemas.microsoft.com/sharepoint/v3/contenttype/forms">
+  <Display>DocumentLibraryForm</Display>
+  <Edit>DocumentLibraryForm</Edit>
+  <New>DocumentLibraryForm</New>
+</FormTemplates>
+</file>
+
 <file path=customXml/item3.xml><?xml version="1.0" encoding="utf-8"?>
 <p:properties xmlns:p="http://schemas.microsoft.com/office/2006/metadata/properties" xmlns:xsi="http://www.w3.org/2001/XMLSchema-instance" xmlns:pc="http://schemas.microsoft.com/office/infopath/2007/PartnerControls">
   <documentManagement/>
@@ -8098,14 +8098,6 @@
 </file>
 
 <file path=customXml/itemProps1.xml><?xml version="1.0" encoding="utf-8"?>
-<ds:datastoreItem xmlns:ds="http://schemas.openxmlformats.org/officeDocument/2006/customXml" ds:itemID="{950F9D87-7CA7-4A94-A5E5-A374AFD83891}">
-  <ds:schemaRefs>
-    <ds:schemaRef ds:uri="http://schemas.microsoft.com/sharepoint/v3/contenttype/forms"/>
-  </ds:schemaRefs>
-</ds:datastoreItem>
-</file>
-
-<file path=customXml/itemProps2.xml><?xml version="1.0" encoding="utf-8"?>
 <ds:datastoreItem xmlns:ds="http://schemas.openxmlformats.org/officeDocument/2006/customXml" ds:itemID="{DF1A254C-4026-4073-B28E-6230090BFEFF}">
   <ds:schemaRefs>
     <ds:schemaRef ds:uri="http://schemas.microsoft.com/office/2006/metadata/contentType"/>
@@ -8124,6 +8116,14 @@
 </ds:datastoreItem>
 </file>
 
+<file path=customXml/itemProps2.xml><?xml version="1.0" encoding="utf-8"?>
+<ds:datastoreItem xmlns:ds="http://schemas.openxmlformats.org/officeDocument/2006/customXml" ds:itemID="{950F9D87-7CA7-4A94-A5E5-A374AFD83891}">
+  <ds:schemaRefs>
+    <ds:schemaRef ds:uri="http://schemas.microsoft.com/sharepoint/v3/contenttype/forms"/>
+  </ds:schemaRefs>
+</ds:datastoreItem>
+</file>
+
 <file path=customXml/itemProps3.xml><?xml version="1.0" encoding="utf-8"?>
 <ds:datastoreItem xmlns:ds="http://schemas.openxmlformats.org/officeDocument/2006/customXml" ds:itemID="{C728879B-660B-4583-928D-55E828E68493}">
   <ds:schemaRefs>

</xml_diff>